<commit_message>
Small updates to the FOD slides.
</commit_message>
<xml_diff>
--- a/exercises/cisc-813/fod/slides.pptx
+++ b/exercises/cisc-813/fod/slides.pptx
@@ -125,6 +125,11 @@
       </a:defRPr>
     </a:lvl9pPr>
   </p:defaultTextStyle>
+  <p:extLst>
+    <p:ext uri="{EFAFB233-063F-42B5-8137-9DF3F51BA10A}">
+      <p15:sldGuideLst xmlns:p15="http://schemas.microsoft.com/office/powerpoint/2012/main"/>
+    </p:ext>
+  </p:extLst>
 </p:presentation>
 </file>
 
@@ -694,7 +699,7 @@
           <a:p>
             <a:fld id="{D6D0F569-AC90-44EB-9EF4-4E5C2F5D823C}" type="datetime1">
               <a:rPr lang="en-US" smtClean="0"/>
-              <a:t>12/22/2022</a:t>
+              <a:t>1/19/2023</a:t>
             </a:fld>
             <a:endParaRPr lang="en-US" dirty="0"/>
           </a:p>
@@ -1373,7 +1378,7 @@
           <a:p>
             <a:fld id="{46BA7D41-E8B7-4A0B-B861-3EC4AE88917D}" type="datetime1">
               <a:rPr lang="en-US" smtClean="0"/>
-              <a:t>12/22/2022</a:t>
+              <a:t>1/19/2023</a:t>
             </a:fld>
             <a:endParaRPr lang="en-US" dirty="0"/>
           </a:p>
@@ -2062,7 +2067,7 @@
           <a:p>
             <a:fld id="{A7C34823-0B19-4B4E-A643-7A3B0A3D24D6}" type="datetime1">
               <a:rPr lang="en-US" smtClean="0"/>
-              <a:t>12/22/2022</a:t>
+              <a:t>1/19/2023</a:t>
             </a:fld>
             <a:endParaRPr lang="en-US" dirty="0"/>
           </a:p>
@@ -3410,7 +3415,7 @@
           <a:p>
             <a:fld id="{8C2D79EF-17C8-45D8-9866-DAF5723FC604}" type="datetime1">
               <a:rPr lang="en-US" smtClean="0"/>
-              <a:t>12/22/2022</a:t>
+              <a:t>1/19/2023</a:t>
             </a:fld>
             <a:endParaRPr lang="en-US" dirty="0"/>
           </a:p>
@@ -4165,7 +4170,7 @@
           <a:p>
             <a:fld id="{DFFC2ADC-3680-4013-A757-E4663495DB98}" type="datetime1">
               <a:rPr lang="en-US" smtClean="0"/>
-              <a:t>12/22/2022</a:t>
+              <a:t>1/19/2023</a:t>
             </a:fld>
             <a:endParaRPr lang="en-US" dirty="0"/>
           </a:p>
@@ -4912,7 +4917,7 @@
           <a:p>
             <a:fld id="{4751BA94-5DCA-4F19-960F-0FB2BD5EE85A}" type="datetime1">
               <a:rPr lang="en-US" smtClean="0"/>
-              <a:t>12/22/2022</a:t>
+              <a:t>1/19/2023</a:t>
             </a:fld>
             <a:endParaRPr lang="en-US" dirty="0"/>
           </a:p>
@@ -5806,7 +5811,7 @@
           <a:p>
             <a:fld id="{01BED947-38D9-44AC-8B89-E79758333B77}" type="datetime1">
               <a:rPr lang="en-US" smtClean="0"/>
-              <a:t>12/22/2022</a:t>
+              <a:t>1/19/2023</a:t>
             </a:fld>
             <a:endParaRPr lang="en-US" dirty="0"/>
           </a:p>
@@ -6427,7 +6432,7 @@
           <a:p>
             <a:fld id="{3781E23F-BD3C-4F23-B116-2B758120C8AC}" type="datetime1">
               <a:rPr lang="en-US" smtClean="0"/>
-              <a:t>12/22/2022</a:t>
+              <a:t>1/19/2023</a:t>
             </a:fld>
             <a:endParaRPr lang="en-US" dirty="0"/>
           </a:p>
@@ -7019,7 +7024,7 @@
           <a:p>
             <a:fld id="{473CFAA9-6D59-4D98-869E-ACBDB83B2CA4}" type="datetime1">
               <a:rPr lang="en-US" smtClean="0"/>
-              <a:t>12/22/2022</a:t>
+              <a:t>1/19/2023</a:t>
             </a:fld>
             <a:endParaRPr lang="en-US"/>
           </a:p>
@@ -7811,7 +7816,7 @@
           <a:p>
             <a:fld id="{DC410804-27E3-430A-BB42-B831260DE39A}" type="datetime1">
               <a:rPr lang="en-US" smtClean="0"/>
-              <a:t>12/22/2022</a:t>
+              <a:t>1/19/2023</a:t>
             </a:fld>
             <a:endParaRPr lang="en-US" dirty="0"/>
           </a:p>
@@ -8582,7 +8587,7 @@
           <a:p>
             <a:fld id="{60E22DE3-3D1A-4D53-B9A6-6C7463B8C992}" type="datetime1">
               <a:rPr lang="en-US" smtClean="0"/>
-              <a:t>12/22/2022</a:t>
+              <a:t>1/19/2023</a:t>
             </a:fld>
             <a:endParaRPr lang="en-US" dirty="0"/>
           </a:p>
@@ -8893,7 +8898,7 @@
             <a:fld id="{5ECD8B30-1B71-45A1-8314-D59C86F581E1}" type="datetime1">
               <a:rPr lang="en-US" smtClean="0"/>
               <a:pPr/>
-              <a:t>12/22/2022</a:t>
+              <a:t>1/19/2023</a:t>
             </a:fld>
             <a:endParaRPr lang="en-US" b="1" dirty="0"/>
           </a:p>
@@ -10461,7 +10466,15 @@
             </a:r>
             <a:r>
               <a:rPr b="0" dirty="0"/>
-              <a:t> Robot in right room, and hand is free</a:t>
+              <a:t> Robot</a:t>
+            </a:r>
+            <a:r>
+              <a:rPr lang="en-US" b="0" dirty="0"/>
+              <a:t> and crate</a:t>
+            </a:r>
+            <a:r>
+              <a:rPr b="0" dirty="0"/>
+              <a:t> in right room, and hand is free</a:t>
             </a:r>
           </a:p>
           <a:p>
@@ -10482,6 +10495,15 @@
               <a:rPr b="0" dirty="0"/>
               <a:t>Crate now being held</a:t>
             </a:r>
+            <a:r>
+              <a:rPr lang="en-US" b="0" dirty="0"/>
+              <a:t> (and no longer in </a:t>
+            </a:r>
+            <a:r>
+              <a:rPr lang="en-US" b="0"/>
+              <a:t>the room)</a:t>
+            </a:r>
+            <a:endParaRPr b="0" dirty="0"/>
           </a:p>
         </p:txBody>
       </p:sp>

</xml_diff>